<commit_message>
UPD presentation and 'readme'
</commit_message>
<xml_diff>
--- a/Trap them.pptx
+++ b/Trap them.pptx
@@ -109,6 +109,11 @@
       </a:defRPr>
     </a:lvl9pPr>
   </p:defaultTextStyle>
+  <p:extLst>
+    <p:ext uri="{EFAFB233-063F-42B5-8137-9DF3F51BA10A}">
+      <p15:sldGuideLst xmlns:p15="http://schemas.microsoft.com/office/powerpoint/2012/main"/>
+    </p:ext>
+  </p:extLst>
 </p:presentation>
 </file>
 
@@ -338,7 +343,7 @@
           <a:p>
             <a:fld id="{80852AFD-DEE8-49E9-BC12-FAF705112EEC}" type="datetimeFigureOut">
               <a:rPr lang="ru-RU" smtClean="0"/>
-              <a:t>02.01.2021</a:t>
+              <a:t>09.01.2021</a:t>
             </a:fld>
             <a:endParaRPr lang="ru-RU"/>
           </a:p>
@@ -546,7 +551,7 @@
           <a:p>
             <a:fld id="{80852AFD-DEE8-49E9-BC12-FAF705112EEC}" type="datetimeFigureOut">
               <a:rPr lang="ru-RU" smtClean="0"/>
-              <a:t>02.01.2021</a:t>
+              <a:t>09.01.2021</a:t>
             </a:fld>
             <a:endParaRPr lang="ru-RU"/>
           </a:p>
@@ -802,7 +807,7 @@
           <a:p>
             <a:fld id="{80852AFD-DEE8-49E9-BC12-FAF705112EEC}" type="datetimeFigureOut">
               <a:rPr lang="ru-RU" smtClean="0"/>
-              <a:t>02.01.2021</a:t>
+              <a:t>09.01.2021</a:t>
             </a:fld>
             <a:endParaRPr lang="ru-RU"/>
           </a:p>
@@ -976,7 +981,7 @@
           <a:p>
             <a:fld id="{80852AFD-DEE8-49E9-BC12-FAF705112EEC}" type="datetimeFigureOut">
               <a:rPr lang="ru-RU" smtClean="0"/>
-              <a:t>02.01.2021</a:t>
+              <a:t>09.01.2021</a:t>
             </a:fld>
             <a:endParaRPr lang="ru-RU"/>
           </a:p>
@@ -1319,7 +1324,7 @@
           <a:p>
             <a:fld id="{80852AFD-DEE8-49E9-BC12-FAF705112EEC}" type="datetimeFigureOut">
               <a:rPr lang="ru-RU" smtClean="0"/>
-              <a:t>02.01.2021</a:t>
+              <a:t>09.01.2021</a:t>
             </a:fld>
             <a:endParaRPr lang="ru-RU"/>
           </a:p>
@@ -1594,7 +1599,7 @@
           <a:p>
             <a:fld id="{80852AFD-DEE8-49E9-BC12-FAF705112EEC}" type="datetimeFigureOut">
               <a:rPr lang="ru-RU" smtClean="0"/>
-              <a:t>02.01.2021</a:t>
+              <a:t>09.01.2021</a:t>
             </a:fld>
             <a:endParaRPr lang="ru-RU"/>
           </a:p>
@@ -1973,7 +1978,7 @@
           <a:p>
             <a:fld id="{80852AFD-DEE8-49E9-BC12-FAF705112EEC}" type="datetimeFigureOut">
               <a:rPr lang="ru-RU" smtClean="0"/>
-              <a:t>02.01.2021</a:t>
+              <a:t>09.01.2021</a:t>
             </a:fld>
             <a:endParaRPr lang="ru-RU"/>
           </a:p>
@@ -2091,7 +2096,7 @@
           <a:p>
             <a:fld id="{80852AFD-DEE8-49E9-BC12-FAF705112EEC}" type="datetimeFigureOut">
               <a:rPr lang="ru-RU" smtClean="0"/>
-              <a:t>02.01.2021</a:t>
+              <a:t>09.01.2021</a:t>
             </a:fld>
             <a:endParaRPr lang="ru-RU"/>
           </a:p>
@@ -2262,7 +2267,7 @@
           <a:p>
             <a:fld id="{80852AFD-DEE8-49E9-BC12-FAF705112EEC}" type="datetimeFigureOut">
               <a:rPr lang="ru-RU" smtClean="0"/>
-              <a:t>02.01.2021</a:t>
+              <a:t>09.01.2021</a:t>
             </a:fld>
             <a:endParaRPr lang="ru-RU"/>
           </a:p>
@@ -2616,7 +2621,7 @@
           <a:p>
             <a:fld id="{80852AFD-DEE8-49E9-BC12-FAF705112EEC}" type="datetimeFigureOut">
               <a:rPr lang="ru-RU" smtClean="0"/>
-              <a:t>02.01.2021</a:t>
+              <a:t>09.01.2021</a:t>
             </a:fld>
             <a:endParaRPr lang="ru-RU"/>
           </a:p>
@@ -2998,7 +3003,7 @@
           <a:p>
             <a:fld id="{80852AFD-DEE8-49E9-BC12-FAF705112EEC}" type="datetimeFigureOut">
               <a:rPr lang="ru-RU" smtClean="0"/>
-              <a:t>02.01.2021</a:t>
+              <a:t>09.01.2021</a:t>
             </a:fld>
             <a:endParaRPr lang="ru-RU"/>
           </a:p>
@@ -3285,7 +3290,7 @@
           <a:p>
             <a:fld id="{80852AFD-DEE8-49E9-BC12-FAF705112EEC}" type="datetimeFigureOut">
               <a:rPr lang="ru-RU" smtClean="0"/>
-              <a:t>02.01.2021</a:t>
+              <a:t>09.01.2021</a:t>
             </a:fld>
             <a:endParaRPr lang="ru-RU"/>
           </a:p>
@@ -3959,7 +3964,7 @@
       </p:sp>
       <p:pic>
         <p:nvPicPr>
-          <p:cNvPr id="5" name="Рисунок 4"/>
+          <p:cNvPr id="3" name="Рисунок 2"/>
           <p:cNvPicPr>
             <a:picLocks noChangeAspect="1"/>
           </p:cNvPicPr>
@@ -3979,8 +3984,8 @@
         </p:blipFill>
         <p:spPr>
           <a:xfrm>
-            <a:off x="6222278" y="1690672"/>
-            <a:ext cx="4960245" cy="4351354"/>
+            <a:off x="6126480" y="1825625"/>
+            <a:ext cx="5318551" cy="4137229"/>
           </a:xfrm>
           <a:prstGeom prst="rect">
             <a:avLst/>
@@ -4073,7 +4078,7 @@
       </p:sp>
       <p:pic>
         <p:nvPicPr>
-          <p:cNvPr id="5" name="Объект 3"/>
+          <p:cNvPr id="4" name="Рисунок 3"/>
           <p:cNvPicPr>
             <a:picLocks noChangeAspect="1"/>
           </p:cNvPicPr>
@@ -4093,8 +4098,8 @@
         </p:blipFill>
         <p:spPr>
           <a:xfrm>
-            <a:off x="838200" y="1690688"/>
-            <a:ext cx="4948967" cy="4351338"/>
+            <a:off x="1097280" y="1867860"/>
+            <a:ext cx="5141861" cy="3996993"/>
           </a:xfrm>
           <a:prstGeom prst="rect">
             <a:avLst/>
@@ -4174,19 +4179,16 @@
           <a:bodyPr/>
           <a:lstStyle/>
           <a:p>
-            <a:pPr marL="0" indent="0">
-              <a:buNone/>
-            </a:pPr>
             <a:r>
               <a:rPr lang="ru-RU" dirty="0"/>
-              <a:t>Поле. Герой в синих штанах, кружки рядом – возможные ходы, большие жёлтые круги – монетки, справа сверху отображается здоровье игрока, слева сверху количество оставшихся монет.</a:t>
+              <a:t>Поле. Герой в синих штанах, синие кружки – место куда можно поставить ловушки, монетки, слева сверху отображается здоровье игрока и его количество оставшихся действий, справа сверху количество оставшихся монет.</a:t>
             </a:r>
           </a:p>
         </p:txBody>
       </p:sp>
       <p:pic>
         <p:nvPicPr>
-          <p:cNvPr id="4" name="Рисунок 3"/>
+          <p:cNvPr id="5" name="Рисунок 4"/>
           <p:cNvPicPr>
             <a:picLocks noChangeAspect="1"/>
           </p:cNvPicPr>
@@ -4206,8 +4208,8 @@
         </p:blipFill>
         <p:spPr>
           <a:xfrm>
-            <a:off x="838200" y="1690688"/>
-            <a:ext cx="5109594" cy="4480485"/>
+            <a:off x="1097280" y="1825625"/>
+            <a:ext cx="5260368" cy="4114800"/>
           </a:xfrm>
           <a:prstGeom prst="rect">
             <a:avLst/>
@@ -4302,7 +4304,7 @@
       </p:sp>
       <p:pic>
         <p:nvPicPr>
-          <p:cNvPr id="4" name="Рисунок 3"/>
+          <p:cNvPr id="5" name="Рисунок 4"/>
           <p:cNvPicPr>
             <a:picLocks noChangeAspect="1"/>
           </p:cNvPicPr>
@@ -4322,8 +4324,8 @@
         </p:blipFill>
         <p:spPr>
           <a:xfrm>
-            <a:off x="5911412" y="1437991"/>
-            <a:ext cx="5442388" cy="4793446"/>
+            <a:off x="5822704" y="1880099"/>
+            <a:ext cx="5178983" cy="4019660"/>
           </a:xfrm>
           <a:prstGeom prst="rect">
             <a:avLst/>

</xml_diff>